<commit_message>
Update the documentation with the XML Parser examples.  The are a couple of new unit tests and some of the code is adjusted in a minor way (e.g. method visibility).
</commit_message>
<xml_diff>
--- a/doc/state/StateTables.pptx
+++ b/doc/state/StateTables.pptx
@@ -7,8 +7,9 @@
   <p:sldIdLst>
     <p:sldId id="256" r:id="rId2"/>
     <p:sldId id="259" r:id="rId3"/>
-    <p:sldId id="257" r:id="rId4"/>
-    <p:sldId id="258" r:id="rId5"/>
+    <p:sldId id="260" r:id="rId4"/>
+    <p:sldId id="257" r:id="rId5"/>
+    <p:sldId id="258" r:id="rId6"/>
   </p:sldIdLst>
   <p:sldSz cx="9144000" cy="6858000" type="screen4x3"/>
   <p:notesSz cx="6858000" cy="9144000"/>
@@ -292,7 +293,7 @@
             <a:fld id="{956D0292-F28F-4A70-A539-513257EB9152}" type="datetimeFigureOut">
               <a:rPr lang="en-US" smtClean="0"/>
               <a:pPr/>
-              <a:t>6/11/2017</a:t>
+              <a:t>6/17/2017</a:t>
             </a:fld>
             <a:endParaRPr lang="en-US"/>
           </a:p>
@@ -459,7 +460,7 @@
             <a:fld id="{956D0292-F28F-4A70-A539-513257EB9152}" type="datetimeFigureOut">
               <a:rPr lang="en-US" smtClean="0"/>
               <a:pPr/>
-              <a:t>6/11/2017</a:t>
+              <a:t>6/17/2017</a:t>
             </a:fld>
             <a:endParaRPr lang="en-US"/>
           </a:p>
@@ -636,7 +637,7 @@
             <a:fld id="{956D0292-F28F-4A70-A539-513257EB9152}" type="datetimeFigureOut">
               <a:rPr lang="en-US" smtClean="0"/>
               <a:pPr/>
-              <a:t>6/11/2017</a:t>
+              <a:t>6/17/2017</a:t>
             </a:fld>
             <a:endParaRPr lang="en-US"/>
           </a:p>
@@ -803,7 +804,7 @@
             <a:fld id="{956D0292-F28F-4A70-A539-513257EB9152}" type="datetimeFigureOut">
               <a:rPr lang="en-US" smtClean="0"/>
               <a:pPr/>
-              <a:t>6/11/2017</a:t>
+              <a:t>6/17/2017</a:t>
             </a:fld>
             <a:endParaRPr lang="en-US"/>
           </a:p>
@@ -1046,7 +1047,7 @@
             <a:fld id="{956D0292-F28F-4A70-A539-513257EB9152}" type="datetimeFigureOut">
               <a:rPr lang="en-US" smtClean="0"/>
               <a:pPr/>
-              <a:t>6/11/2017</a:t>
+              <a:t>6/17/2017</a:t>
             </a:fld>
             <a:endParaRPr lang="en-US"/>
           </a:p>
@@ -1331,7 +1332,7 @@
             <a:fld id="{956D0292-F28F-4A70-A539-513257EB9152}" type="datetimeFigureOut">
               <a:rPr lang="en-US" smtClean="0"/>
               <a:pPr/>
-              <a:t>6/11/2017</a:t>
+              <a:t>6/17/2017</a:t>
             </a:fld>
             <a:endParaRPr lang="en-US"/>
           </a:p>
@@ -1750,7 +1751,7 @@
             <a:fld id="{956D0292-F28F-4A70-A539-513257EB9152}" type="datetimeFigureOut">
               <a:rPr lang="en-US" smtClean="0"/>
               <a:pPr/>
-              <a:t>6/11/2017</a:t>
+              <a:t>6/17/2017</a:t>
             </a:fld>
             <a:endParaRPr lang="en-US"/>
           </a:p>
@@ -1865,7 +1866,7 @@
             <a:fld id="{956D0292-F28F-4A70-A539-513257EB9152}" type="datetimeFigureOut">
               <a:rPr lang="en-US" smtClean="0"/>
               <a:pPr/>
-              <a:t>6/11/2017</a:t>
+              <a:t>6/17/2017</a:t>
             </a:fld>
             <a:endParaRPr lang="en-US"/>
           </a:p>
@@ -1957,7 +1958,7 @@
             <a:fld id="{956D0292-F28F-4A70-A539-513257EB9152}" type="datetimeFigureOut">
               <a:rPr lang="en-US" smtClean="0"/>
               <a:pPr/>
-              <a:t>6/11/2017</a:t>
+              <a:t>6/17/2017</a:t>
             </a:fld>
             <a:endParaRPr lang="en-US"/>
           </a:p>
@@ -2231,7 +2232,7 @@
             <a:fld id="{956D0292-F28F-4A70-A539-513257EB9152}" type="datetimeFigureOut">
               <a:rPr lang="en-US" smtClean="0"/>
               <a:pPr/>
-              <a:t>6/11/2017</a:t>
+              <a:t>6/17/2017</a:t>
             </a:fld>
             <a:endParaRPr lang="en-US"/>
           </a:p>
@@ -2481,7 +2482,7 @@
             <a:fld id="{956D0292-F28F-4A70-A539-513257EB9152}" type="datetimeFigureOut">
               <a:rPr lang="en-US" smtClean="0"/>
               <a:pPr/>
-              <a:t>6/11/2017</a:t>
+              <a:t>6/17/2017</a:t>
             </a:fld>
             <a:endParaRPr lang="en-US"/>
           </a:p>
@@ -2691,7 +2692,7 @@
             <a:fld id="{956D0292-F28F-4A70-A539-513257EB9152}" type="datetimeFigureOut">
               <a:rPr lang="en-US" smtClean="0"/>
               <a:pPr/>
-              <a:t>6/11/2017</a:t>
+              <a:t>6/17/2017</a:t>
             </a:fld>
             <a:endParaRPr lang="en-US"/>
           </a:p>
@@ -3512,7 +3513,6 @@
               <a:rPr lang="en-US" sz="1200" dirty="0" smtClean="0"/>
               <a:t>Ticket</a:t>
             </a:r>
-            <a:endParaRPr lang="en-US" sz="1200" dirty="0" smtClean="0"/>
           </a:p>
           <a:p>
             <a:r>
@@ -3917,12 +3917,732 @@
         </p:nvSpPr>
         <p:spPr/>
         <p:txBody>
+          <a:bodyPr>
+            <a:normAutofit fontScale="90000"/>
+          </a:bodyPr>
+          <a:lstStyle/>
+          <a:p>
+            <a:r>
+              <a:rPr lang="en-US" dirty="0" smtClean="0"/>
+              <a:t>XML Parsing for Object Construction</a:t>
+            </a:r>
+            <a:endParaRPr lang="en-US" dirty="0"/>
+          </a:p>
+        </p:txBody>
+      </p:sp>
+      <p:sp>
+        <p:nvSpPr>
+          <p:cNvPr id="4" name="Pentagon 3"/>
+          <p:cNvSpPr/>
+          <p:nvPr/>
+        </p:nvSpPr>
+        <p:spPr>
+          <a:xfrm>
+            <a:off x="381000" y="2590800"/>
+            <a:ext cx="990600" cy="838200"/>
+          </a:xfrm>
+          <a:prstGeom prst="homePlate">
+            <a:avLst/>
+          </a:prstGeom>
+          <a:solidFill>
+            <a:schemeClr val="accent2">
+              <a:lumMod val="60000"/>
+              <a:lumOff val="40000"/>
+            </a:schemeClr>
+          </a:solidFill>
+          <a:ln>
+            <a:solidFill>
+              <a:schemeClr val="tx1"/>
+            </a:solidFill>
+          </a:ln>
+        </p:spPr>
+        <p:style>
+          <a:lnRef idx="2">
+            <a:schemeClr val="accent1">
+              <a:shade val="50000"/>
+            </a:schemeClr>
+          </a:lnRef>
+          <a:fillRef idx="1">
+            <a:schemeClr val="accent1"/>
+          </a:fillRef>
+          <a:effectRef idx="0">
+            <a:schemeClr val="accent1"/>
+          </a:effectRef>
+          <a:fontRef idx="minor">
+            <a:schemeClr val="lt1"/>
+          </a:fontRef>
+        </p:style>
+        <p:txBody>
+          <a:bodyPr rtlCol="0" anchor="ctr"/>
+          <a:lstStyle/>
+          <a:p>
+            <a:pPr algn="ctr"/>
+            <a:r>
+              <a:rPr lang="en-US" dirty="0" smtClean="0">
+                <a:solidFill>
+                  <a:schemeClr val="tx1"/>
+                </a:solidFill>
+              </a:rPr>
+              <a:t>SAX Parser</a:t>
+            </a:r>
+            <a:endParaRPr lang="en-US" dirty="0">
+              <a:solidFill>
+                <a:schemeClr val="tx1"/>
+              </a:solidFill>
+            </a:endParaRPr>
+          </a:p>
+        </p:txBody>
+      </p:sp>
+      <p:sp>
+        <p:nvSpPr>
+          <p:cNvPr id="5" name="Chevron 4"/>
+          <p:cNvSpPr/>
+          <p:nvPr/>
+        </p:nvSpPr>
+        <p:spPr>
+          <a:xfrm>
+            <a:off x="1066800" y="2590800"/>
+            <a:ext cx="2209800" cy="838200"/>
+          </a:xfrm>
+          <a:prstGeom prst="chevron">
+            <a:avLst/>
+          </a:prstGeom>
+          <a:solidFill>
+            <a:schemeClr val="accent2">
+              <a:lumMod val="75000"/>
+            </a:schemeClr>
+          </a:solidFill>
+          <a:ln>
+            <a:solidFill>
+              <a:schemeClr val="tx1"/>
+            </a:solidFill>
+          </a:ln>
+        </p:spPr>
+        <p:style>
+          <a:lnRef idx="2">
+            <a:schemeClr val="accent1">
+              <a:shade val="50000"/>
+            </a:schemeClr>
+          </a:lnRef>
+          <a:fillRef idx="1">
+            <a:schemeClr val="accent1"/>
+          </a:fillRef>
+          <a:effectRef idx="0">
+            <a:schemeClr val="accent1"/>
+          </a:effectRef>
+          <a:fontRef idx="minor">
+            <a:schemeClr val="lt1"/>
+          </a:fontRef>
+        </p:style>
+        <p:txBody>
+          <a:bodyPr rtlCol="0" anchor="ctr"/>
+          <a:lstStyle/>
+          <a:p>
+            <a:pPr algn="ctr"/>
+            <a:r>
+              <a:rPr lang="en-US" dirty="0" smtClean="0">
+                <a:solidFill>
+                  <a:schemeClr val="bg1"/>
+                </a:solidFill>
+              </a:rPr>
+              <a:t>SAX Event to XML Event Adapter </a:t>
+            </a:r>
+            <a:endParaRPr lang="en-US" dirty="0">
+              <a:solidFill>
+                <a:schemeClr val="bg1"/>
+              </a:solidFill>
+            </a:endParaRPr>
+          </a:p>
+        </p:txBody>
+      </p:sp>
+      <p:sp>
+        <p:nvSpPr>
+          <p:cNvPr id="6" name="Chevron 5"/>
+          <p:cNvSpPr/>
+          <p:nvPr/>
+        </p:nvSpPr>
+        <p:spPr>
+          <a:xfrm>
+            <a:off x="2971800" y="2590800"/>
+            <a:ext cx="2133600" cy="838200"/>
+          </a:xfrm>
+          <a:prstGeom prst="chevron">
+            <a:avLst/>
+          </a:prstGeom>
+          <a:solidFill>
+            <a:schemeClr val="accent3">
+              <a:lumMod val="60000"/>
+              <a:lumOff val="40000"/>
+            </a:schemeClr>
+          </a:solidFill>
+          <a:ln>
+            <a:solidFill>
+              <a:schemeClr val="tx1"/>
+            </a:solidFill>
+          </a:ln>
+        </p:spPr>
+        <p:style>
+          <a:lnRef idx="2">
+            <a:schemeClr val="accent1">
+              <a:shade val="50000"/>
+            </a:schemeClr>
+          </a:lnRef>
+          <a:fillRef idx="1">
+            <a:schemeClr val="accent1"/>
+          </a:fillRef>
+          <a:effectRef idx="0">
+            <a:schemeClr val="accent1"/>
+          </a:effectRef>
+          <a:fontRef idx="minor">
+            <a:schemeClr val="lt1"/>
+          </a:fontRef>
+        </p:style>
+        <p:txBody>
+          <a:bodyPr rtlCol="0" anchor="ctr"/>
+          <a:lstStyle/>
+          <a:p>
+            <a:pPr algn="ctr"/>
+            <a:r>
+              <a:rPr lang="en-US" dirty="0" smtClean="0">
+                <a:solidFill>
+                  <a:schemeClr val="tx1"/>
+                </a:solidFill>
+              </a:rPr>
+              <a:t>XML Object Builder Adapter </a:t>
+            </a:r>
+            <a:endParaRPr lang="en-US" dirty="0">
+              <a:solidFill>
+                <a:schemeClr val="tx1"/>
+              </a:solidFill>
+            </a:endParaRPr>
+          </a:p>
+        </p:txBody>
+      </p:sp>
+      <p:sp>
+        <p:nvSpPr>
+          <p:cNvPr id="7" name="Chevron 6"/>
+          <p:cNvSpPr/>
+          <p:nvPr/>
+        </p:nvSpPr>
+        <p:spPr>
+          <a:xfrm>
+            <a:off x="4800600" y="2590800"/>
+            <a:ext cx="2286000" cy="838200"/>
+          </a:xfrm>
+          <a:prstGeom prst="chevron">
+            <a:avLst/>
+          </a:prstGeom>
+          <a:solidFill>
+            <a:schemeClr val="accent3">
+              <a:lumMod val="75000"/>
+            </a:schemeClr>
+          </a:solidFill>
+          <a:ln>
+            <a:solidFill>
+              <a:schemeClr val="tx1"/>
+            </a:solidFill>
+          </a:ln>
+        </p:spPr>
+        <p:style>
+          <a:lnRef idx="2">
+            <a:schemeClr val="accent1">
+              <a:shade val="50000"/>
+            </a:schemeClr>
+          </a:lnRef>
+          <a:fillRef idx="1">
+            <a:schemeClr val="accent1"/>
+          </a:fillRef>
+          <a:effectRef idx="0">
+            <a:schemeClr val="accent1"/>
+          </a:effectRef>
+          <a:fontRef idx="minor">
+            <a:schemeClr val="lt1"/>
+          </a:fontRef>
+        </p:style>
+        <p:txBody>
+          <a:bodyPr rtlCol="0" anchor="ctr"/>
+          <a:lstStyle/>
+          <a:p>
+            <a:pPr algn="ctr"/>
+            <a:r>
+              <a:rPr lang="en-US" dirty="0" smtClean="0">
+                <a:solidFill>
+                  <a:schemeClr val="tx1"/>
+                </a:solidFill>
+              </a:rPr>
+              <a:t>Object Construction Controller</a:t>
+            </a:r>
+            <a:endParaRPr lang="en-US" dirty="0">
+              <a:solidFill>
+                <a:schemeClr val="tx1"/>
+              </a:solidFill>
+            </a:endParaRPr>
+          </a:p>
+        </p:txBody>
+      </p:sp>
+      <p:sp>
+        <p:nvSpPr>
+          <p:cNvPr id="8" name="Chevron 7"/>
+          <p:cNvSpPr/>
+          <p:nvPr/>
+        </p:nvSpPr>
+        <p:spPr>
+          <a:xfrm>
+            <a:off x="6781800" y="2590800"/>
+            <a:ext cx="1981200" cy="838200"/>
+          </a:xfrm>
+          <a:prstGeom prst="chevron">
+            <a:avLst/>
+          </a:prstGeom>
+          <a:solidFill>
+            <a:schemeClr val="accent5">
+              <a:lumMod val="60000"/>
+              <a:lumOff val="40000"/>
+            </a:schemeClr>
+          </a:solidFill>
+          <a:ln>
+            <a:solidFill>
+              <a:schemeClr val="tx1"/>
+            </a:solidFill>
+          </a:ln>
+        </p:spPr>
+        <p:style>
+          <a:lnRef idx="2">
+            <a:schemeClr val="accent1">
+              <a:shade val="50000"/>
+            </a:schemeClr>
+          </a:lnRef>
+          <a:fillRef idx="1">
+            <a:schemeClr val="accent1"/>
+          </a:fillRef>
+          <a:effectRef idx="0">
+            <a:schemeClr val="accent1"/>
+          </a:effectRef>
+          <a:fontRef idx="minor">
+            <a:schemeClr val="lt1"/>
+          </a:fontRef>
+        </p:style>
+        <p:txBody>
+          <a:bodyPr rtlCol="0" anchor="ctr"/>
+          <a:lstStyle/>
+          <a:p>
+            <a:pPr algn="ctr"/>
+            <a:r>
+              <a:rPr lang="en-US" dirty="0" smtClean="0">
+                <a:solidFill>
+                  <a:schemeClr val="tx1"/>
+                </a:solidFill>
+              </a:rPr>
+              <a:t>Object Consumer</a:t>
+            </a:r>
+            <a:endParaRPr lang="en-US" dirty="0">
+              <a:solidFill>
+                <a:schemeClr val="tx1"/>
+              </a:solidFill>
+            </a:endParaRPr>
+          </a:p>
+        </p:txBody>
+      </p:sp>
+      <p:cxnSp>
+        <p:nvCxnSpPr>
+          <p:cNvPr id="10" name="Straight Arrow Connector 9"/>
+          <p:cNvCxnSpPr/>
+          <p:nvPr/>
+        </p:nvCxnSpPr>
+        <p:spPr>
+          <a:xfrm>
+            <a:off x="838200" y="3657600"/>
+            <a:ext cx="685800" cy="0"/>
+          </a:xfrm>
+          <a:prstGeom prst="straightConnector1">
+            <a:avLst/>
+          </a:prstGeom>
+          <a:ln w="63500">
+            <a:headEnd type="oval"/>
+            <a:tailEnd type="arrow"/>
+          </a:ln>
+        </p:spPr>
+        <p:style>
+          <a:lnRef idx="1">
+            <a:schemeClr val="accent1"/>
+          </a:lnRef>
+          <a:fillRef idx="0">
+            <a:schemeClr val="accent1"/>
+          </a:fillRef>
+          <a:effectRef idx="0">
+            <a:schemeClr val="accent1"/>
+          </a:effectRef>
+          <a:fontRef idx="minor">
+            <a:schemeClr val="tx1"/>
+          </a:fontRef>
+        </p:style>
+      </p:cxnSp>
+      <p:sp>
+        <p:nvSpPr>
+          <p:cNvPr id="12" name="TextBox 11"/>
+          <p:cNvSpPr txBox="1"/>
+          <p:nvPr/>
+        </p:nvSpPr>
+        <p:spPr>
+          <a:xfrm>
+            <a:off x="533400" y="3745468"/>
+            <a:ext cx="1219200" cy="369332"/>
+          </a:xfrm>
+          <a:prstGeom prst="rect">
+            <a:avLst/>
+          </a:prstGeom>
+          <a:noFill/>
+        </p:spPr>
+        <p:txBody>
+          <a:bodyPr wrap="square" rtlCol="0">
+            <a:spAutoFit/>
+          </a:bodyPr>
+          <a:lstStyle/>
+          <a:p>
+            <a:pPr algn="ctr"/>
+            <a:r>
+              <a:rPr lang="en-US" dirty="0" smtClean="0"/>
+              <a:t>SAX Event</a:t>
+            </a:r>
+            <a:endParaRPr lang="en-US" dirty="0"/>
+          </a:p>
+        </p:txBody>
+      </p:sp>
+      <p:cxnSp>
+        <p:nvCxnSpPr>
+          <p:cNvPr id="13" name="Straight Arrow Connector 12"/>
+          <p:cNvCxnSpPr/>
+          <p:nvPr/>
+        </p:nvCxnSpPr>
+        <p:spPr>
+          <a:xfrm>
+            <a:off x="2590800" y="3657600"/>
+            <a:ext cx="685800" cy="0"/>
+          </a:xfrm>
+          <a:prstGeom prst="straightConnector1">
+            <a:avLst/>
+          </a:prstGeom>
+          <a:ln w="63500">
+            <a:headEnd type="oval"/>
+            <a:tailEnd type="arrow"/>
+          </a:ln>
+        </p:spPr>
+        <p:style>
+          <a:lnRef idx="1">
+            <a:schemeClr val="accent1"/>
+          </a:lnRef>
+          <a:fillRef idx="0">
+            <a:schemeClr val="accent1"/>
+          </a:fillRef>
+          <a:effectRef idx="0">
+            <a:schemeClr val="accent1"/>
+          </a:effectRef>
+          <a:fontRef idx="minor">
+            <a:schemeClr val="tx1"/>
+          </a:fontRef>
+        </p:style>
+      </p:cxnSp>
+      <p:sp>
+        <p:nvSpPr>
+          <p:cNvPr id="14" name="TextBox 13"/>
+          <p:cNvSpPr txBox="1"/>
+          <p:nvPr/>
+        </p:nvSpPr>
+        <p:spPr>
+          <a:xfrm>
+            <a:off x="2286000" y="3745468"/>
+            <a:ext cx="1219200" cy="369332"/>
+          </a:xfrm>
+          <a:prstGeom prst="rect">
+            <a:avLst/>
+          </a:prstGeom>
+          <a:noFill/>
+        </p:spPr>
+        <p:txBody>
+          <a:bodyPr wrap="square" rtlCol="0">
+            <a:spAutoFit/>
+          </a:bodyPr>
+          <a:lstStyle/>
+          <a:p>
+            <a:pPr algn="ctr"/>
+            <a:r>
+              <a:rPr lang="en-US" dirty="0" smtClean="0"/>
+              <a:t>XML Event</a:t>
+            </a:r>
+            <a:endParaRPr lang="en-US" dirty="0"/>
+          </a:p>
+        </p:txBody>
+      </p:sp>
+      <p:cxnSp>
+        <p:nvCxnSpPr>
+          <p:cNvPr id="15" name="Straight Arrow Connector 14"/>
+          <p:cNvCxnSpPr/>
+          <p:nvPr/>
+        </p:nvCxnSpPr>
+        <p:spPr>
+          <a:xfrm>
+            <a:off x="4419600" y="3657600"/>
+            <a:ext cx="685800" cy="0"/>
+          </a:xfrm>
+          <a:prstGeom prst="straightConnector1">
+            <a:avLst/>
+          </a:prstGeom>
+          <a:ln w="63500">
+            <a:headEnd type="oval"/>
+            <a:tailEnd type="arrow"/>
+          </a:ln>
+        </p:spPr>
+        <p:style>
+          <a:lnRef idx="1">
+            <a:schemeClr val="accent1"/>
+          </a:lnRef>
+          <a:fillRef idx="0">
+            <a:schemeClr val="accent1"/>
+          </a:fillRef>
+          <a:effectRef idx="0">
+            <a:schemeClr val="accent1"/>
+          </a:effectRef>
+          <a:fontRef idx="minor">
+            <a:schemeClr val="tx1"/>
+          </a:fontRef>
+        </p:style>
+      </p:cxnSp>
+      <p:sp>
+        <p:nvSpPr>
+          <p:cNvPr id="16" name="TextBox 15"/>
+          <p:cNvSpPr txBox="1"/>
+          <p:nvPr/>
+        </p:nvSpPr>
+        <p:spPr>
+          <a:xfrm>
+            <a:off x="3962400" y="3745468"/>
+            <a:ext cx="1447800" cy="369332"/>
+          </a:xfrm>
+          <a:prstGeom prst="rect">
+            <a:avLst/>
+          </a:prstGeom>
+          <a:noFill/>
+        </p:spPr>
+        <p:txBody>
+          <a:bodyPr wrap="square" rtlCol="0">
+            <a:spAutoFit/>
+          </a:bodyPr>
+          <a:lstStyle/>
+          <a:p>
+            <a:pPr algn="ctr"/>
+            <a:r>
+              <a:rPr lang="en-US" dirty="0" smtClean="0"/>
+              <a:t>Object Event</a:t>
+            </a:r>
+            <a:endParaRPr lang="en-US" dirty="0"/>
+          </a:p>
+        </p:txBody>
+      </p:sp>
+      <p:cxnSp>
+        <p:nvCxnSpPr>
+          <p:cNvPr id="17" name="Straight Arrow Connector 16"/>
+          <p:cNvCxnSpPr/>
+          <p:nvPr/>
+        </p:nvCxnSpPr>
+        <p:spPr>
+          <a:xfrm>
+            <a:off x="6400800" y="3657600"/>
+            <a:ext cx="685800" cy="0"/>
+          </a:xfrm>
+          <a:prstGeom prst="straightConnector1">
+            <a:avLst/>
+          </a:prstGeom>
+          <a:ln w="63500">
+            <a:headEnd type="oval"/>
+            <a:tailEnd type="arrow"/>
+          </a:ln>
+        </p:spPr>
+        <p:style>
+          <a:lnRef idx="1">
+            <a:schemeClr val="accent1"/>
+          </a:lnRef>
+          <a:fillRef idx="0">
+            <a:schemeClr val="accent1"/>
+          </a:fillRef>
+          <a:effectRef idx="0">
+            <a:schemeClr val="accent1"/>
+          </a:effectRef>
+          <a:fontRef idx="minor">
+            <a:schemeClr val="tx1"/>
+          </a:fontRef>
+        </p:style>
+      </p:cxnSp>
+      <p:sp>
+        <p:nvSpPr>
+          <p:cNvPr id="18" name="TextBox 17"/>
+          <p:cNvSpPr txBox="1"/>
+          <p:nvPr/>
+        </p:nvSpPr>
+        <p:spPr>
+          <a:xfrm>
+            <a:off x="6096000" y="3745468"/>
+            <a:ext cx="1066800" cy="369332"/>
+          </a:xfrm>
+          <a:prstGeom prst="rect">
+            <a:avLst/>
+          </a:prstGeom>
+          <a:noFill/>
+        </p:spPr>
+        <p:txBody>
+          <a:bodyPr wrap="square" rtlCol="0">
+            <a:spAutoFit/>
+          </a:bodyPr>
+          <a:lstStyle/>
+          <a:p>
+            <a:pPr algn="ctr"/>
+            <a:r>
+              <a:rPr lang="en-US" dirty="0" smtClean="0"/>
+              <a:t>POJO</a:t>
+            </a:r>
+            <a:endParaRPr lang="en-US" dirty="0"/>
+          </a:p>
+        </p:txBody>
+      </p:sp>
+      <p:cxnSp>
+        <p:nvCxnSpPr>
+          <p:cNvPr id="19" name="Straight Arrow Connector 18"/>
+          <p:cNvCxnSpPr/>
+          <p:nvPr/>
+        </p:nvCxnSpPr>
+        <p:spPr>
+          <a:xfrm>
+            <a:off x="685800" y="2057400"/>
+            <a:ext cx="0" cy="457200"/>
+          </a:xfrm>
+          <a:prstGeom prst="straightConnector1">
+            <a:avLst/>
+          </a:prstGeom>
+          <a:ln w="63500">
+            <a:headEnd type="oval"/>
+            <a:tailEnd type="arrow"/>
+          </a:ln>
+        </p:spPr>
+        <p:style>
+          <a:lnRef idx="1">
+            <a:schemeClr val="accent1"/>
+          </a:lnRef>
+          <a:fillRef idx="0">
+            <a:schemeClr val="accent1"/>
+          </a:fillRef>
+          <a:effectRef idx="0">
+            <a:schemeClr val="accent1"/>
+          </a:effectRef>
+          <a:fontRef idx="minor">
+            <a:schemeClr val="tx1"/>
+          </a:fontRef>
+        </p:style>
+      </p:cxnSp>
+      <p:sp>
+        <p:nvSpPr>
+          <p:cNvPr id="22" name="Folded Corner 21"/>
+          <p:cNvSpPr/>
+          <p:nvPr/>
+        </p:nvSpPr>
+        <p:spPr>
+          <a:xfrm>
+            <a:off x="381000" y="1371600"/>
+            <a:ext cx="609600" cy="457200"/>
+          </a:xfrm>
+          <a:prstGeom prst="foldedCorner">
+            <a:avLst/>
+          </a:prstGeom>
+          <a:solidFill>
+            <a:schemeClr val="accent6">
+              <a:lumMod val="60000"/>
+              <a:lumOff val="40000"/>
+            </a:schemeClr>
+          </a:solidFill>
+          <a:ln>
+            <a:solidFill>
+              <a:schemeClr val="tx1"/>
+            </a:solidFill>
+          </a:ln>
+        </p:spPr>
+        <p:style>
+          <a:lnRef idx="2">
+            <a:schemeClr val="accent1">
+              <a:shade val="50000"/>
+            </a:schemeClr>
+          </a:lnRef>
+          <a:fillRef idx="1">
+            <a:schemeClr val="accent1"/>
+          </a:fillRef>
+          <a:effectRef idx="0">
+            <a:schemeClr val="accent1"/>
+          </a:effectRef>
+          <a:fontRef idx="minor">
+            <a:schemeClr val="lt1"/>
+          </a:fontRef>
+        </p:style>
+        <p:txBody>
+          <a:bodyPr rtlCol="0" anchor="ctr"/>
+          <a:lstStyle/>
+          <a:p>
+            <a:pPr algn="ctr"/>
+            <a:r>
+              <a:rPr lang="en-US" sz="1600" b="1" dirty="0" smtClean="0">
+                <a:solidFill>
+                  <a:schemeClr val="tx1"/>
+                </a:solidFill>
+              </a:rPr>
+              <a:t>XML</a:t>
+            </a:r>
+            <a:endParaRPr lang="en-US" sz="2800" b="1" dirty="0">
+              <a:solidFill>
+                <a:schemeClr val="tx1"/>
+              </a:solidFill>
+            </a:endParaRPr>
+          </a:p>
+        </p:txBody>
+      </p:sp>
+    </p:spTree>
+  </p:cSld>
+  <p:clrMapOvr>
+    <a:masterClrMapping/>
+  </p:clrMapOvr>
+</p:sld>
+</file>
+
+<file path=ppt/slides/slide4.xml><?xml version="1.0" encoding="utf-8"?>
+<p:sld xmlns:a="http://schemas.openxmlformats.org/drawingml/2006/main" xmlns:r="http://schemas.openxmlformats.org/officeDocument/2006/relationships" xmlns:p="http://schemas.openxmlformats.org/presentationml/2006/main">
+  <p:cSld>
+    <p:spTree>
+      <p:nvGrpSpPr>
+        <p:cNvPr id="1" name=""/>
+        <p:cNvGrpSpPr/>
+        <p:nvPr/>
+      </p:nvGrpSpPr>
+      <p:grpSpPr>
+        <a:xfrm>
+          <a:off x="0" y="0"/>
+          <a:ext cx="0" cy="0"/>
+          <a:chOff x="0" y="0"/>
+          <a:chExt cx="0" cy="0"/>
+        </a:xfrm>
+      </p:grpSpPr>
+      <p:sp>
+        <p:nvSpPr>
+          <p:cNvPr id="2" name="Title 1"/>
+          <p:cNvSpPr>
+            <a:spLocks noGrp="1"/>
+          </p:cNvSpPr>
+          <p:nvPr>
+            <p:ph type="title"/>
+          </p:nvPr>
+        </p:nvSpPr>
+        <p:spPr/>
+        <p:txBody>
           <a:bodyPr/>
           <a:lstStyle/>
           <a:p>
             <a:r>
               <a:rPr lang="en-US" dirty="0" smtClean="0"/>
-              <a:t>XML Object Construction</a:t>
+              <a:t>XML Object Builder Adapter</a:t>
             </a:r>
             <a:endParaRPr lang="en-US" dirty="0"/>
           </a:p>
@@ -3936,7 +4656,7 @@
         </p:nvSpPr>
         <p:spPr>
           <a:xfrm>
-            <a:off x="1600200" y="1905000"/>
+            <a:off x="1066800" y="1981200"/>
             <a:ext cx="1295400" cy="609600"/>
           </a:xfrm>
           <a:prstGeom prst="ellipse">
@@ -3973,14 +4693,14 @@
           <a:p>
             <a:pPr algn="ctr"/>
             <a:r>
-              <a:rPr lang="en-US" sz="1200" dirty="0" smtClean="0">
+              <a:rPr lang="en-US" sz="1200" b="1" dirty="0" smtClean="0">
                 <a:solidFill>
                   <a:schemeClr val="tx1"/>
                 </a:solidFill>
               </a:rPr>
               <a:t>Awaiting Document</a:t>
             </a:r>
-            <a:endParaRPr lang="en-US" dirty="0">
+            <a:endParaRPr lang="en-US" b="1" dirty="0">
               <a:solidFill>
                 <a:schemeClr val="tx1"/>
               </a:solidFill>
@@ -3996,7 +4716,7 @@
         </p:nvSpPr>
         <p:spPr>
           <a:xfrm>
-            <a:off x="3962400" y="2209800"/>
+            <a:off x="3200400" y="2209800"/>
             <a:ext cx="1524000" cy="685800"/>
           </a:xfrm>
           <a:prstGeom prst="ellipse">
@@ -4033,14 +4753,14 @@
           <a:p>
             <a:pPr algn="ctr"/>
             <a:r>
-              <a:rPr lang="en-US" sz="1200" dirty="0" smtClean="0">
+              <a:rPr lang="en-US" sz="1200" b="1" dirty="0" smtClean="0">
                 <a:solidFill>
                   <a:schemeClr val="tx1"/>
                 </a:solidFill>
               </a:rPr>
               <a:t>Awaiting Object Element Start</a:t>
             </a:r>
-            <a:endParaRPr lang="en-US" dirty="0">
+            <a:endParaRPr lang="en-US" b="1" dirty="0">
               <a:solidFill>
                 <a:schemeClr val="tx1"/>
               </a:solidFill>
@@ -4056,7 +4776,7 @@
         </p:nvSpPr>
         <p:spPr>
           <a:xfrm>
-            <a:off x="4648200" y="3657600"/>
+            <a:off x="3886200" y="3657600"/>
             <a:ext cx="1295400" cy="609600"/>
           </a:xfrm>
           <a:prstGeom prst="ellipse">
@@ -4093,14 +4813,14 @@
           <a:p>
             <a:pPr algn="ctr"/>
             <a:r>
-              <a:rPr lang="en-US" sz="1200" dirty="0" smtClean="0">
+              <a:rPr lang="en-US" sz="1200" b="1" dirty="0" smtClean="0">
                 <a:solidFill>
                   <a:schemeClr val="tx1"/>
                 </a:solidFill>
               </a:rPr>
               <a:t>Building Object</a:t>
             </a:r>
-            <a:endParaRPr lang="en-US" dirty="0">
+            <a:endParaRPr lang="en-US" b="1" dirty="0">
               <a:solidFill>
                 <a:schemeClr val="tx1"/>
               </a:solidFill>
@@ -4116,7 +4836,7 @@
         </p:nvSpPr>
         <p:spPr>
           <a:xfrm>
-            <a:off x="3505200" y="4953000"/>
+            <a:off x="3886200" y="5105400"/>
             <a:ext cx="1295400" cy="609600"/>
           </a:xfrm>
           <a:prstGeom prst="ellipse">
@@ -4153,14 +4873,14 @@
           <a:p>
             <a:pPr algn="ctr"/>
             <a:r>
-              <a:rPr lang="en-US" sz="1200" dirty="0" smtClean="0">
+              <a:rPr lang="en-US" sz="1200" b="1" dirty="0" smtClean="0">
                 <a:solidFill>
                   <a:schemeClr val="tx1"/>
                 </a:solidFill>
               </a:rPr>
               <a:t>Building Field</a:t>
             </a:r>
-            <a:endParaRPr lang="en-US" dirty="0">
+            <a:endParaRPr lang="en-US" b="1" dirty="0">
               <a:solidFill>
                 <a:schemeClr val="tx1"/>
               </a:solidFill>
@@ -4172,19 +4892,19 @@
         <p:nvCxnSpPr>
           <p:cNvPr id="8" name="Straight Arrow Connector 7"/>
           <p:cNvCxnSpPr>
-            <a:stCxn id="3" idx="6"/>
-            <a:endCxn id="4" idx="2"/>
+            <a:stCxn id="3" idx="7"/>
+            <a:endCxn id="4" idx="1"/>
           </p:cNvCxnSpPr>
           <p:nvPr/>
         </p:nvCxnSpPr>
         <p:spPr>
-          <a:xfrm>
-            <a:off x="2895600" y="2209800"/>
-            <a:ext cx="1066800" cy="342900"/>
+          <a:xfrm rot="16200000" flipH="1">
+            <a:off x="2678159" y="1564807"/>
+            <a:ext cx="239759" cy="1251092"/>
           </a:xfrm>
           <a:prstGeom prst="curvedConnector3">
             <a:avLst>
-              <a:gd name="adj1" fmla="val 50000"/>
+              <a:gd name="adj1" fmla="val -132581"/>
             </a:avLst>
           </a:prstGeom>
           <a:ln w="25400">
@@ -4217,8 +4937,8 @@
         </p:nvSpPr>
         <p:spPr>
           <a:xfrm>
-            <a:off x="2971800" y="1905000"/>
-            <a:ext cx="1219200" cy="276999"/>
+            <a:off x="2362200" y="1295400"/>
+            <a:ext cx="1905000" cy="461665"/>
           </a:xfrm>
           <a:prstGeom prst="rect">
             <a:avLst/>
@@ -4232,10 +4952,15 @@
           <a:lstStyle/>
           <a:p>
             <a:r>
+              <a:rPr lang="en-US" sz="1200" b="1" dirty="0" smtClean="0"/>
+              <a:t>Start Document</a:t>
+            </a:r>
+          </a:p>
+          <a:p>
+            <a:r>
               <a:rPr lang="en-US" sz="1200" dirty="0" smtClean="0"/>
-              <a:t>Start Document</a:t>
-            </a:r>
-            <a:endParaRPr lang="en-US" sz="1200" dirty="0"/>
+              <a:t>[Process Document Start]</a:t>
+            </a:r>
           </a:p>
         </p:txBody>
       </p:sp>
@@ -4250,7 +4975,7 @@
         </p:nvCxnSpPr>
         <p:spPr>
           <a:xfrm rot="16200000" flipH="1">
-            <a:off x="4629150" y="2990850"/>
+            <a:off x="3867150" y="2990850"/>
             <a:ext cx="762000" cy="571500"/>
           </a:xfrm>
           <a:prstGeom prst="curvedConnector3">
@@ -4290,9 +5015,9 @@
           <p:nvPr/>
         </p:nvCxnSpPr>
         <p:spPr>
-          <a:xfrm rot="5400000">
-            <a:off x="4107867" y="4222960"/>
-            <a:ext cx="775074" cy="685007"/>
+          <a:xfrm rot="16200000" flipH="1">
+            <a:off x="3841166" y="4412666"/>
+            <a:ext cx="927474" cy="457993"/>
           </a:xfrm>
           <a:prstGeom prst="curvedConnector3">
             <a:avLst>
@@ -4331,12 +5056,15 @@
           <p:nvPr/>
         </p:nvCxnSpPr>
         <p:spPr>
-          <a:xfrm flipV="1">
-            <a:off x="4800600" y="4267200"/>
-            <a:ext cx="495300" cy="990600"/>
-          </a:xfrm>
-          <a:prstGeom prst="curvedConnector2">
-            <a:avLst/>
+          <a:xfrm flipH="1" flipV="1">
+            <a:off x="4533900" y="4267200"/>
+            <a:ext cx="647700" cy="1143000"/>
+          </a:xfrm>
+          <a:prstGeom prst="curvedConnector4">
+            <a:avLst>
+              <a:gd name="adj1" fmla="val -35294"/>
+              <a:gd name="adj2" fmla="val 63333"/>
+            </a:avLst>
           </a:prstGeom>
           <a:ln w="25400">
             <a:solidFill>
@@ -4371,7 +5099,7 @@
         </p:nvCxnSpPr>
         <p:spPr>
           <a:xfrm flipH="1" flipV="1">
-            <a:off x="5753893" y="3746874"/>
+            <a:off x="4991893" y="3746874"/>
             <a:ext cx="189707" cy="215526"/>
           </a:xfrm>
           <a:prstGeom prst="curvedConnector4">
@@ -4413,7 +5141,7 @@
         </p:nvCxnSpPr>
         <p:spPr>
           <a:xfrm flipH="1">
-            <a:off x="5753893" y="3962400"/>
+            <a:off x="4991893" y="3962400"/>
             <a:ext cx="189707" cy="215526"/>
           </a:xfrm>
           <a:prstGeom prst="curvedConnector4">
@@ -4455,7 +5183,7 @@
         </p:nvCxnSpPr>
         <p:spPr>
           <a:xfrm flipH="1" flipV="1">
-            <a:off x="5263215" y="2310233"/>
+            <a:off x="4501215" y="2310233"/>
             <a:ext cx="223185" cy="242467"/>
           </a:xfrm>
           <a:prstGeom prst="curvedConnector4">
@@ -4494,8 +5222,8 @@
         </p:nvSpPr>
         <p:spPr>
           <a:xfrm>
-            <a:off x="5105400" y="1676400"/>
-            <a:ext cx="1066800" cy="276999"/>
+            <a:off x="4953000" y="1981200"/>
+            <a:ext cx="1600200" cy="461665"/>
           </a:xfrm>
           <a:prstGeom prst="rect">
             <a:avLst/>
@@ -4509,68 +5237,14 @@
           <a:lstStyle/>
           <a:p>
             <a:r>
+              <a:rPr lang="en-US" sz="1200" b="1" dirty="0" smtClean="0"/>
+              <a:t>Whitespace</a:t>
+            </a:r>
+          </a:p>
+          <a:p>
+            <a:r>
               <a:rPr lang="en-US" sz="1200" dirty="0" smtClean="0"/>
-              <a:t>White Space</a:t>
-            </a:r>
-            <a:endParaRPr lang="en-US" sz="1200" dirty="0"/>
-          </a:p>
-        </p:txBody>
-      </p:sp>
-      <p:sp>
-        <p:nvSpPr>
-          <p:cNvPr id="47" name="TextBox 46"/>
-          <p:cNvSpPr txBox="1"/>
-          <p:nvPr/>
-        </p:nvSpPr>
-        <p:spPr>
-          <a:xfrm>
-            <a:off x="5562600" y="4572000"/>
-            <a:ext cx="1066800" cy="276999"/>
-          </a:xfrm>
-          <a:prstGeom prst="rect">
-            <a:avLst/>
-          </a:prstGeom>
-          <a:noFill/>
-        </p:spPr>
-        <p:txBody>
-          <a:bodyPr wrap="square" rtlCol="0">
-            <a:spAutoFit/>
-          </a:bodyPr>
-          <a:lstStyle/>
-          <a:p>
-            <a:r>
-              <a:rPr lang="en-US" sz="1200" dirty="0" smtClean="0"/>
-              <a:t>White Space</a:t>
-            </a:r>
-            <a:endParaRPr lang="en-US" sz="1200" dirty="0"/>
-          </a:p>
-        </p:txBody>
-      </p:sp>
-      <p:sp>
-        <p:nvSpPr>
-          <p:cNvPr id="48" name="TextBox 47"/>
-          <p:cNvSpPr txBox="1"/>
-          <p:nvPr/>
-        </p:nvSpPr>
-        <p:spPr>
-          <a:xfrm>
-            <a:off x="2971800" y="5867400"/>
-            <a:ext cx="1066800" cy="276999"/>
-          </a:xfrm>
-          <a:prstGeom prst="rect">
-            <a:avLst/>
-          </a:prstGeom>
-          <a:noFill/>
-        </p:spPr>
-        <p:txBody>
-          <a:bodyPr wrap="square" rtlCol="0">
-            <a:spAutoFit/>
-          </a:bodyPr>
-          <a:lstStyle/>
-          <a:p>
-            <a:r>
-              <a:rPr lang="en-US" sz="1200" dirty="0" smtClean="0"/>
-              <a:t>White Space</a:t>
+              <a:t>[Process Whitespace]</a:t>
             </a:r>
             <a:endParaRPr lang="en-US" sz="1200" dirty="0"/>
           </a:p>
@@ -4587,7 +5261,7 @@
         </p:nvCxnSpPr>
         <p:spPr>
           <a:xfrm rot="10800000" flipH="1">
-            <a:off x="4648199" y="3746874"/>
+            <a:off x="3886199" y="3746874"/>
             <a:ext cx="189707" cy="215526"/>
           </a:xfrm>
           <a:prstGeom prst="curvedConnector4">
@@ -4629,7 +5303,7 @@
         </p:nvCxnSpPr>
         <p:spPr>
           <a:xfrm rot="10800000" flipH="1" flipV="1">
-            <a:off x="3505199" y="5257800"/>
+            <a:off x="3886199" y="5410200"/>
             <a:ext cx="189707" cy="215526"/>
           </a:xfrm>
           <a:prstGeom prst="curvedConnector4">
@@ -4668,8 +5342,8 @@
         </p:nvSpPr>
         <p:spPr>
           <a:xfrm>
-            <a:off x="3733800" y="4343400"/>
-            <a:ext cx="914400" cy="461665"/>
+            <a:off x="2667000" y="4415135"/>
+            <a:ext cx="1752600" cy="461665"/>
           </a:xfrm>
           <a:prstGeom prst="rect">
             <a:avLst/>
@@ -4683,10 +5357,16 @@
           <a:lstStyle/>
           <a:p>
             <a:r>
+              <a:rPr lang="en-US" sz="1200" b="1" dirty="0" smtClean="0"/>
+              <a:t>Character Data</a:t>
+            </a:r>
+            <a:endParaRPr lang="en-US" sz="1200" dirty="0"/>
+          </a:p>
+          <a:p>
+            <a:r>
               <a:rPr lang="en-US" sz="1200" dirty="0" smtClean="0"/>
-              <a:t>Character Data</a:t>
-            </a:r>
-            <a:endParaRPr lang="en-US" sz="1200" dirty="0"/>
+              <a:t>[Process Character Data]</a:t>
+            </a:r>
           </a:p>
         </p:txBody>
       </p:sp>
@@ -4701,7 +5381,7 @@
         </p:nvCxnSpPr>
         <p:spPr>
           <a:xfrm rot="5400000" flipH="1" flipV="1">
-            <a:off x="4337259" y="5288966"/>
+            <a:off x="4718259" y="5441366"/>
             <a:ext cx="89274" cy="457993"/>
           </a:xfrm>
           <a:prstGeom prst="curvedConnector3">
@@ -4733,14 +5413,14 @@
       </p:cxnSp>
       <p:sp>
         <p:nvSpPr>
-          <p:cNvPr id="68" name="TextBox 67"/>
+          <p:cNvPr id="69" name="TextBox 68"/>
           <p:cNvSpPr txBox="1"/>
           <p:nvPr/>
         </p:nvSpPr>
         <p:spPr>
           <a:xfrm>
-            <a:off x="3962400" y="5867400"/>
-            <a:ext cx="1143000" cy="276999"/>
+            <a:off x="5410200" y="4724400"/>
+            <a:ext cx="2971800" cy="461665"/>
           </a:xfrm>
           <a:prstGeom prst="rect">
             <a:avLst/>
@@ -4754,8 +5434,14 @@
           <a:lstStyle/>
           <a:p>
             <a:r>
+              <a:rPr lang="en-US" sz="1200" b="1" dirty="0" smtClean="0"/>
+              <a:t>End Element</a:t>
+            </a:r>
+          </a:p>
+          <a:p>
+            <a:r>
               <a:rPr lang="en-US" sz="1200" dirty="0" smtClean="0"/>
-              <a:t>Character Data</a:t>
+              <a:t>[Process End Element, Signal Simple Value]</a:t>
             </a:r>
             <a:endParaRPr lang="en-US" sz="1200" dirty="0"/>
           </a:p>
@@ -4763,14 +5449,14 @@
       </p:sp>
       <p:sp>
         <p:nvSpPr>
-          <p:cNvPr id="69" name="TextBox 68"/>
+          <p:cNvPr id="71" name="TextBox 70"/>
           <p:cNvSpPr txBox="1"/>
           <p:nvPr/>
         </p:nvSpPr>
         <p:spPr>
           <a:xfrm>
-            <a:off x="5105400" y="5029200"/>
-            <a:ext cx="1143000" cy="461665"/>
+            <a:off x="5410200" y="3429000"/>
+            <a:ext cx="2971800" cy="461665"/>
           </a:xfrm>
           <a:prstGeom prst="rect">
             <a:avLst/>
@@ -4784,22 +5470,14 @@
           <a:lstStyle/>
           <a:p>
             <a:r>
+              <a:rPr lang="en-US" sz="1200" b="1" dirty="0" smtClean="0"/>
+              <a:t>Start Element</a:t>
+            </a:r>
+          </a:p>
+          <a:p>
+            <a:r>
               <a:rPr lang="en-US" sz="1200" dirty="0" smtClean="0"/>
-              <a:t>End Element</a:t>
-            </a:r>
-          </a:p>
-          <a:p>
-            <a:r>
-              <a:rPr lang="en-US" sz="1200" dirty="0" smtClean="0"/>
-              <a:t>[</a:t>
-            </a:r>
-            <a:r>
-              <a:rPr lang="en-US" sz="1200" b="1" dirty="0" smtClean="0"/>
-              <a:t>Simple Value</a:t>
-            </a:r>
-            <a:r>
-              <a:rPr lang="en-US" sz="1200" dirty="0" smtClean="0"/>
-              <a:t>]</a:t>
+              <a:t>[Process Element Start, Signal Entity Start]</a:t>
             </a:r>
             <a:endParaRPr lang="en-US" sz="1200" dirty="0"/>
           </a:p>
@@ -4807,14 +5485,14 @@
       </p:sp>
       <p:sp>
         <p:nvSpPr>
-          <p:cNvPr id="70" name="TextBox 69"/>
+          <p:cNvPr id="72" name="TextBox 71"/>
           <p:cNvSpPr txBox="1"/>
           <p:nvPr/>
         </p:nvSpPr>
         <p:spPr>
           <a:xfrm>
-            <a:off x="3581400" y="3048000"/>
-            <a:ext cx="1143000" cy="461665"/>
+            <a:off x="4343400" y="2891135"/>
+            <a:ext cx="3048000" cy="461665"/>
           </a:xfrm>
           <a:prstGeom prst="rect">
             <a:avLst/>
@@ -4828,110 +5506,14 @@
           <a:lstStyle/>
           <a:p>
             <a:r>
+              <a:rPr lang="en-US" sz="1200" b="1" dirty="0" smtClean="0"/>
+              <a:t>Start Element</a:t>
+            </a:r>
+          </a:p>
+          <a:p>
+            <a:r>
               <a:rPr lang="en-US" sz="1200" dirty="0" smtClean="0"/>
-              <a:t>End Element</a:t>
-            </a:r>
-          </a:p>
-          <a:p>
-            <a:r>
-              <a:rPr lang="en-US" sz="1200" dirty="0" smtClean="0"/>
-              <a:t>[</a:t>
-            </a:r>
-            <a:r>
-              <a:rPr lang="en-US" sz="1200" b="1" dirty="0" smtClean="0"/>
-              <a:t>Object Value</a:t>
-            </a:r>
-            <a:r>
-              <a:rPr lang="en-US" sz="1200" dirty="0" smtClean="0"/>
-              <a:t>]</a:t>
-            </a:r>
-            <a:endParaRPr lang="en-US" sz="1200" dirty="0"/>
-          </a:p>
-        </p:txBody>
-      </p:sp>
-      <p:sp>
-        <p:nvSpPr>
-          <p:cNvPr id="71" name="TextBox 70"/>
-          <p:cNvSpPr txBox="1"/>
-          <p:nvPr/>
-        </p:nvSpPr>
-        <p:spPr>
-          <a:xfrm>
-            <a:off x="6172200" y="3429000"/>
-            <a:ext cx="1143000" cy="461665"/>
-          </a:xfrm>
-          <a:prstGeom prst="rect">
-            <a:avLst/>
-          </a:prstGeom>
-          <a:noFill/>
-        </p:spPr>
-        <p:txBody>
-          <a:bodyPr wrap="square" rtlCol="0">
-            <a:spAutoFit/>
-          </a:bodyPr>
-          <a:lstStyle/>
-          <a:p>
-            <a:r>
-              <a:rPr lang="en-US" sz="1200" dirty="0" smtClean="0"/>
-              <a:t>Start Element</a:t>
-            </a:r>
-          </a:p>
-          <a:p>
-            <a:r>
-              <a:rPr lang="en-US" sz="1200" dirty="0" smtClean="0"/>
-              <a:t>[</a:t>
-            </a:r>
-            <a:r>
-              <a:rPr lang="en-US" sz="1200" b="1" dirty="0" smtClean="0"/>
-              <a:t>Entry Start</a:t>
-            </a:r>
-            <a:r>
-              <a:rPr lang="en-US" sz="1200" dirty="0" smtClean="0"/>
-              <a:t>]</a:t>
-            </a:r>
-            <a:endParaRPr lang="en-US" sz="1200" dirty="0"/>
-          </a:p>
-        </p:txBody>
-      </p:sp>
-      <p:sp>
-        <p:nvSpPr>
-          <p:cNvPr id="72" name="TextBox 71"/>
-          <p:cNvSpPr txBox="1"/>
-          <p:nvPr/>
-        </p:nvSpPr>
-        <p:spPr>
-          <a:xfrm>
-            <a:off x="5029200" y="2895600"/>
-            <a:ext cx="1143000" cy="461665"/>
-          </a:xfrm>
-          <a:prstGeom prst="rect">
-            <a:avLst/>
-          </a:prstGeom>
-          <a:noFill/>
-        </p:spPr>
-        <p:txBody>
-          <a:bodyPr wrap="square" rtlCol="0">
-            <a:spAutoFit/>
-          </a:bodyPr>
-          <a:lstStyle/>
-          <a:p>
-            <a:r>
-              <a:rPr lang="en-US" sz="1200" dirty="0" smtClean="0"/>
-              <a:t>Start Element</a:t>
-            </a:r>
-          </a:p>
-          <a:p>
-            <a:r>
-              <a:rPr lang="en-US" sz="1200" dirty="0" smtClean="0"/>
-              <a:t>[</a:t>
-            </a:r>
-            <a:r>
-              <a:rPr lang="en-US" sz="1200" b="1" dirty="0" smtClean="0"/>
-              <a:t>Root Start</a:t>
-            </a:r>
-            <a:r>
-              <a:rPr lang="en-US" sz="1200" dirty="0" smtClean="0"/>
-              <a:t>]</a:t>
+              <a:t>[Process Element Start, Signal Root Start]</a:t>
             </a:r>
             <a:endParaRPr lang="en-US" sz="1200" dirty="0"/>
           </a:p>
@@ -4948,8 +5530,8 @@
         </p:nvCxnSpPr>
         <p:spPr>
           <a:xfrm rot="10800000">
-            <a:off x="2247900" y="2514600"/>
-            <a:ext cx="2400300" cy="1447800"/>
+            <a:off x="1714500" y="2590800"/>
+            <a:ext cx="2171700" cy="1371600"/>
           </a:xfrm>
           <a:prstGeom prst="curvedConnector2">
             <a:avLst/>
@@ -4984,8 +5566,8 @@
         </p:nvSpPr>
         <p:spPr>
           <a:xfrm>
-            <a:off x="2057400" y="3276600"/>
-            <a:ext cx="914400" cy="646331"/>
+            <a:off x="1219200" y="3576935"/>
+            <a:ext cx="1828800" cy="461665"/>
           </a:xfrm>
           <a:prstGeom prst="rect">
             <a:avLst/>
@@ -4999,22 +5581,158 @@
           <a:lstStyle/>
           <a:p>
             <a:r>
+              <a:rPr lang="en-US" sz="1200" b="1" dirty="0" smtClean="0"/>
+              <a:t>End Document</a:t>
+            </a:r>
+          </a:p>
+          <a:p>
+            <a:r>
               <a:rPr lang="en-US" sz="1200" dirty="0" smtClean="0"/>
-              <a:t>End Document</a:t>
+              <a:t>[Process Document End]</a:t>
+            </a:r>
+            <a:endParaRPr lang="en-US" sz="1200" dirty="0"/>
+          </a:p>
+        </p:txBody>
+      </p:sp>
+      <p:sp>
+        <p:nvSpPr>
+          <p:cNvPr id="51" name="TextBox 50"/>
+          <p:cNvSpPr txBox="1"/>
+          <p:nvPr/>
+        </p:nvSpPr>
+        <p:spPr>
+          <a:xfrm>
+            <a:off x="2590800" y="2971800"/>
+            <a:ext cx="1600200" cy="461665"/>
+          </a:xfrm>
+          <a:prstGeom prst="rect">
+            <a:avLst/>
+          </a:prstGeom>
+          <a:noFill/>
+        </p:spPr>
+        <p:txBody>
+          <a:bodyPr wrap="square" rtlCol="0">
+            <a:spAutoFit/>
+          </a:bodyPr>
+          <a:lstStyle/>
+          <a:p>
+            <a:r>
+              <a:rPr lang="en-US" sz="1200" b="1" dirty="0" smtClean="0"/>
+              <a:t>Whitespace</a:t>
             </a:r>
           </a:p>
           <a:p>
             <a:r>
               <a:rPr lang="en-US" sz="1200" dirty="0" smtClean="0"/>
-              <a:t>[</a:t>
-            </a:r>
+              <a:t>[Process Whitespace]</a:t>
+            </a:r>
+            <a:endParaRPr lang="en-US" sz="1200" dirty="0"/>
+          </a:p>
+        </p:txBody>
+      </p:sp>
+      <p:sp>
+        <p:nvSpPr>
+          <p:cNvPr id="75" name="TextBox 74"/>
+          <p:cNvSpPr txBox="1"/>
+          <p:nvPr/>
+        </p:nvSpPr>
+        <p:spPr>
+          <a:xfrm>
+            <a:off x="2514600" y="5786735"/>
+            <a:ext cx="1752600" cy="461665"/>
+          </a:xfrm>
+          <a:prstGeom prst="rect">
+            <a:avLst/>
+          </a:prstGeom>
+          <a:noFill/>
+        </p:spPr>
+        <p:txBody>
+          <a:bodyPr wrap="square" rtlCol="0">
+            <a:spAutoFit/>
+          </a:bodyPr>
+          <a:lstStyle/>
+          <a:p>
             <a:r>
               <a:rPr lang="en-US" sz="1200" b="1" dirty="0" smtClean="0"/>
-              <a:t>Done</a:t>
-            </a:r>
+              <a:t>Character Data</a:t>
+            </a:r>
+            <a:endParaRPr lang="en-US" sz="1200" dirty="0"/>
+          </a:p>
+          <a:p>
             <a:r>
               <a:rPr lang="en-US" sz="1200" dirty="0" smtClean="0"/>
-              <a:t>]</a:t>
+              <a:t>[Process Character Data]</a:t>
+            </a:r>
+          </a:p>
+        </p:txBody>
+      </p:sp>
+      <p:sp>
+        <p:nvSpPr>
+          <p:cNvPr id="80" name="TextBox 79"/>
+          <p:cNvSpPr txBox="1"/>
+          <p:nvPr/>
+        </p:nvSpPr>
+        <p:spPr>
+          <a:xfrm>
+            <a:off x="4495800" y="6015335"/>
+            <a:ext cx="1600200" cy="461665"/>
+          </a:xfrm>
+          <a:prstGeom prst="rect">
+            <a:avLst/>
+          </a:prstGeom>
+          <a:noFill/>
+        </p:spPr>
+        <p:txBody>
+          <a:bodyPr wrap="square" rtlCol="0">
+            <a:spAutoFit/>
+          </a:bodyPr>
+          <a:lstStyle/>
+          <a:p>
+            <a:r>
+              <a:rPr lang="en-US" sz="1200" b="1" dirty="0" smtClean="0"/>
+              <a:t>Whitespace</a:t>
+            </a:r>
+          </a:p>
+          <a:p>
+            <a:r>
+              <a:rPr lang="en-US" sz="1200" dirty="0" smtClean="0"/>
+              <a:t>[Process Whitespace]</a:t>
+            </a:r>
+            <a:endParaRPr lang="en-US" sz="1200" dirty="0"/>
+          </a:p>
+        </p:txBody>
+      </p:sp>
+      <p:sp>
+        <p:nvSpPr>
+          <p:cNvPr id="81" name="TextBox 80"/>
+          <p:cNvSpPr txBox="1"/>
+          <p:nvPr/>
+        </p:nvSpPr>
+        <p:spPr>
+          <a:xfrm>
+            <a:off x="5410200" y="4034135"/>
+            <a:ext cx="2819400" cy="461665"/>
+          </a:xfrm>
+          <a:prstGeom prst="rect">
+            <a:avLst/>
+          </a:prstGeom>
+          <a:noFill/>
+        </p:spPr>
+        <p:txBody>
+          <a:bodyPr wrap="square" rtlCol="0">
+            <a:spAutoFit/>
+          </a:bodyPr>
+          <a:lstStyle/>
+          <a:p>
+            <a:r>
+              <a:rPr lang="en-US" sz="1200" b="1" dirty="0" smtClean="0"/>
+              <a:t>End Element</a:t>
+            </a:r>
+          </a:p>
+          <a:p>
+            <a:r>
+              <a:rPr lang="en-US" sz="1200" dirty="0" smtClean="0"/>
+              <a:t>[Process End Element, Signal Object Done]</a:t>
             </a:r>
             <a:endParaRPr lang="en-US" sz="1200" dirty="0"/>
           </a:p>
@@ -5028,7 +5746,7 @@
 </p:sld>
 </file>
 
-<file path=ppt/slides/slide4.xml><?xml version="1.0" encoding="utf-8"?>
+<file path=ppt/slides/slide5.xml><?xml version="1.0" encoding="utf-8"?>
 <p:sld xmlns:a="http://schemas.openxmlformats.org/drawingml/2006/main" xmlns:r="http://schemas.openxmlformats.org/officeDocument/2006/relationships" xmlns:p="http://schemas.openxmlformats.org/presentationml/2006/main">
   <p:cSld>
     <p:spTree>

</xml_diff>